<commit_message>
Reword some english and highlight certain statements
</commit_message>
<xml_diff>
--- a/ProjectReport/02_DetailedInstallation/Setting up ChattyISS.pptx
+++ b/ProjectReport/02_DetailedInstallation/Setting up ChattyISS.pptx
@@ -3848,7 +3848,7 @@
             </a:pPr>
             <a:r>
               <a:rPr lang="en-SG" sz="2800" dirty="0"/>
-              <a:t>Port deployment (Verify status)</a:t>
+              <a:t>Migration procedure</a:t>
             </a:r>
           </a:p>
           <a:p>
@@ -5190,7 +5190,11 @@
               <a:buChar char="•"/>
             </a:pPr>
             <a:r>
-              <a:rPr lang="en-SG" sz="2800" dirty="0"/>
+              <a:rPr lang="en-SG" sz="2800" dirty="0">
+                <a:highlight>
+                  <a:srgbClr val="00FF00"/>
+                </a:highlight>
+              </a:rPr>
               <a:t>chatbot.py</a:t>
             </a:r>
           </a:p>
@@ -5200,7 +5204,11 @@
               <a:buChar char="•"/>
             </a:pPr>
             <a:r>
-              <a:rPr lang="en-SG" sz="2800" dirty="0"/>
+              <a:rPr lang="en-SG" sz="2800" dirty="0">
+                <a:highlight>
+                  <a:srgbClr val="00FF00"/>
+                </a:highlight>
+              </a:rPr>
               <a:t>chatbot_gpt4.py</a:t>
             </a:r>
           </a:p>
@@ -5210,7 +5218,11 @@
               <a:buChar char="•"/>
             </a:pPr>
             <a:r>
-              <a:rPr lang="en-SG" sz="2800" dirty="0"/>
+              <a:rPr lang="en-SG" sz="2800" dirty="0">
+                <a:highlight>
+                  <a:srgbClr val="00FF00"/>
+                </a:highlight>
+              </a:rPr>
               <a:t>imagebot.py</a:t>
             </a:r>
           </a:p>
@@ -5220,7 +5232,11 @@
               <a:buChar char="•"/>
             </a:pPr>
             <a:r>
-              <a:rPr lang="en-SG" sz="2800" dirty="0"/>
+              <a:rPr lang="en-SG" sz="2800" dirty="0">
+                <a:highlight>
+                  <a:srgbClr val="00FF00"/>
+                </a:highlight>
+              </a:rPr>
               <a:t>ingestion.py</a:t>
             </a:r>
           </a:p>
@@ -5230,7 +5246,11 @@
               <a:buChar char="•"/>
             </a:pPr>
             <a:r>
-              <a:rPr lang="en-SG" sz="2800" dirty="0"/>
+              <a:rPr lang="en-SG" sz="2800" dirty="0">
+                <a:highlight>
+                  <a:srgbClr val="00FF00"/>
+                </a:highlight>
+              </a:rPr>
               <a:t>understandingimages_llama.py</a:t>
             </a:r>
           </a:p>

</xml_diff>